<commit_message>
Updated response to reflective question 1 of Tutorial01
</commit_message>
<xml_diff>
--- a/Tutorials/POLS6320_2020_Spring_Tutorial01a_Organizations-Mental-Health-and-Ethics.pptx
+++ b/Tutorials/POLS6320_2020_Spring_Tutorial01a_Organizations-Mental-Health-and-Ethics.pptx
@@ -1585,27 +1585,27 @@
     </dgm:pt>
   </dgm:ptLst>
   <dgm:cxnLst>
+    <dgm:cxn modelId="{AD8795E8-DA3E-4223-9BB9-366C01F03279}" type="presOf" srcId="{DD4BE7A6-7D48-4015-858C-41A555729EE6}" destId="{DC0E0ED7-EEF4-4931-8EA6-B0593F71D27D}" srcOrd="1" destOrd="0" presId="urn:microsoft.com/office/officeart/2005/8/layout/cycle4"/>
+    <dgm:cxn modelId="{54C94A31-8839-4FFD-9900-5F1145CA0506}" srcId="{160F1536-9538-4B76-BFA1-B29DB4A6F2CC}" destId="{7A8A297C-7A33-48B3-888B-D62F93ABB95F}" srcOrd="0" destOrd="0" parTransId="{CE91B881-1DDD-4C72-872C-7994585695B5}" sibTransId="{571DE5C9-6164-44AD-9C1D-F577AF68DCD7}"/>
+    <dgm:cxn modelId="{C938C346-BFC6-4BBB-8A5E-23CDCA2AA01F}" srcId="{B5246D22-F1C4-42EF-AF7E-5A6E083E06BE}" destId="{DD4BE7A6-7D48-4015-858C-41A555729EE6}" srcOrd="0" destOrd="0" parTransId="{5C8BF3E7-EB50-4DB3-A492-9D6CCABA4F13}" sibTransId="{D859C5C0-39C3-418E-A4A3-7BC52404B07C}"/>
+    <dgm:cxn modelId="{9ECB8A65-B04F-4ECF-873B-0A3EF70B1213}" srcId="{8718D101-6F58-4713-9023-E04FB802558B}" destId="{4C45CB6E-386C-483F-849F-3962BD872546}" srcOrd="0" destOrd="0" parTransId="{E5C9AA1E-07A2-48A3-8D33-8316BD638599}" sibTransId="{41CDFAC5-E827-4582-830F-6CA3AF7427AF}"/>
+    <dgm:cxn modelId="{28EAB083-08DB-4C8E-87D9-2D807C699C77}" type="presOf" srcId="{4C45CB6E-386C-483F-849F-3962BD872546}" destId="{544580C4-CA5A-4274-8187-1C906BB74BA2}" srcOrd="1" destOrd="0" presId="urn:microsoft.com/office/officeart/2005/8/layout/cycle4"/>
+    <dgm:cxn modelId="{AF0F0661-2887-4660-8CDE-70726F2015F2}" type="presOf" srcId="{7A8A297C-7A33-48B3-888B-D62F93ABB95F}" destId="{853F5BE1-35E6-41B6-A868-B0C4AE3C30C3}" srcOrd="1" destOrd="0" presId="urn:microsoft.com/office/officeart/2005/8/layout/cycle4"/>
+    <dgm:cxn modelId="{12F67248-A0B4-4703-B000-1C23B2A5B388}" type="presOf" srcId="{4C45CB6E-386C-483F-849F-3962BD872546}" destId="{C7F7CC99-D77D-4950-A006-B2B47EF8124F}" srcOrd="0" destOrd="0" presId="urn:microsoft.com/office/officeart/2005/8/layout/cycle4"/>
+    <dgm:cxn modelId="{7B9ED8A9-DC19-4CE0-94EB-25B5D6FEB116}" srcId="{B323B78F-BB25-49AA-A1BB-D92BB18B27C6}" destId="{160F1536-9538-4B76-BFA1-B29DB4A6F2CC}" srcOrd="2" destOrd="0" parTransId="{344FCEED-87F7-4C37-93B8-660EBD2EC9C5}" sibTransId="{1E9C847E-E0F6-45A9-9CCF-58F24E915BAE}"/>
+    <dgm:cxn modelId="{9952A954-A397-46DD-9343-2656B2D8454C}" type="presOf" srcId="{EA5DB221-F9BE-4AC9-BF6B-681613B4498B}" destId="{09A3B669-FE4F-484E-A2F8-568EC36E55F8}" srcOrd="0" destOrd="0" presId="urn:microsoft.com/office/officeart/2005/8/layout/cycle4"/>
+    <dgm:cxn modelId="{C2EA404F-640C-439B-921B-165756642CF3}" type="presOf" srcId="{B323B78F-BB25-49AA-A1BB-D92BB18B27C6}" destId="{7F3AED1E-5E34-49A9-80EE-2BAF95662F63}" srcOrd="0" destOrd="0" presId="urn:microsoft.com/office/officeart/2005/8/layout/cycle4"/>
+    <dgm:cxn modelId="{752DD2ED-F008-4B76-B3AC-3B5250D4A691}" type="presOf" srcId="{DD4BE7A6-7D48-4015-858C-41A555729EE6}" destId="{C5BC7F09-7482-4602-8BCA-A6450C56B822}" srcOrd="0" destOrd="0" presId="urn:microsoft.com/office/officeart/2005/8/layout/cycle4"/>
+    <dgm:cxn modelId="{EA24EA07-9790-414C-8549-5C105314E28E}" type="presOf" srcId="{E2A41C94-1F9F-452D-83C6-DA9B2D1A2C68}" destId="{2B9613C3-D2E9-40EF-A4AA-68924063BA1F}" srcOrd="0" destOrd="0" presId="urn:microsoft.com/office/officeart/2005/8/layout/cycle4"/>
+    <dgm:cxn modelId="{FAB39BC5-9C73-4AE5-8CC0-C882D4B93751}" srcId="{E2A41C94-1F9F-452D-83C6-DA9B2D1A2C68}" destId="{EA5DB221-F9BE-4AC9-BF6B-681613B4498B}" srcOrd="0" destOrd="0" parTransId="{83FA5649-E297-4FF8-961C-A110D464F7DD}" sibTransId="{2CD6C70B-E063-4275-95AF-69CDF063F02B}"/>
+    <dgm:cxn modelId="{5F32F9EB-EA38-431B-892B-C22E94E5A8F8}" type="presOf" srcId="{7A8A297C-7A33-48B3-888B-D62F93ABB95F}" destId="{26F33BD2-96FC-4362-900B-9153F27E2535}" srcOrd="0" destOrd="0" presId="urn:microsoft.com/office/officeart/2005/8/layout/cycle4"/>
+    <dgm:cxn modelId="{72431A6F-4D1C-4898-BF7D-5C79DB8660F0}" type="presOf" srcId="{8718D101-6F58-4713-9023-E04FB802558B}" destId="{6C1B52EF-0897-493D-8151-CCD00F1DE4F3}" srcOrd="0" destOrd="0" presId="urn:microsoft.com/office/officeart/2005/8/layout/cycle4"/>
+    <dgm:cxn modelId="{B7B35D3C-99E2-4865-9D6C-C3DF7A22D988}" srcId="{B323B78F-BB25-49AA-A1BB-D92BB18B27C6}" destId="{E2A41C94-1F9F-452D-83C6-DA9B2D1A2C68}" srcOrd="1" destOrd="0" parTransId="{B1A99176-0D53-463F-95E6-54FB983E494B}" sibTransId="{1B72A678-30C1-43D0-A16B-0379AC004B9E}"/>
+    <dgm:cxn modelId="{E8D11270-5DA8-4DD6-BFB6-3D68B7FD2206}" type="presOf" srcId="{B5246D22-F1C4-42EF-AF7E-5A6E083E06BE}" destId="{F888FE5C-8131-4834-9C83-167149FC77C3}" srcOrd="0" destOrd="0" presId="urn:microsoft.com/office/officeart/2005/8/layout/cycle4"/>
     <dgm:cxn modelId="{BD363C03-72B8-4374-9376-61145FDB1668}" type="presOf" srcId="{160F1536-9538-4B76-BFA1-B29DB4A6F2CC}" destId="{07DD3E41-9278-4491-AA47-989F55BBBBEE}" srcOrd="0" destOrd="0" presId="urn:microsoft.com/office/officeart/2005/8/layout/cycle4"/>
-    <dgm:cxn modelId="{EA24EA07-9790-414C-8549-5C105314E28E}" type="presOf" srcId="{E2A41C94-1F9F-452D-83C6-DA9B2D1A2C68}" destId="{2B9613C3-D2E9-40EF-A4AA-68924063BA1F}" srcOrd="0" destOrd="0" presId="urn:microsoft.com/office/officeart/2005/8/layout/cycle4"/>
-    <dgm:cxn modelId="{54C94A31-8839-4FFD-9900-5F1145CA0506}" srcId="{160F1536-9538-4B76-BFA1-B29DB4A6F2CC}" destId="{7A8A297C-7A33-48B3-888B-D62F93ABB95F}" srcOrd="0" destOrd="0" parTransId="{CE91B881-1DDD-4C72-872C-7994585695B5}" sibTransId="{571DE5C9-6164-44AD-9C1D-F577AF68DCD7}"/>
-    <dgm:cxn modelId="{B7B35D3C-99E2-4865-9D6C-C3DF7A22D988}" srcId="{B323B78F-BB25-49AA-A1BB-D92BB18B27C6}" destId="{E2A41C94-1F9F-452D-83C6-DA9B2D1A2C68}" srcOrd="1" destOrd="0" parTransId="{B1A99176-0D53-463F-95E6-54FB983E494B}" sibTransId="{1B72A678-30C1-43D0-A16B-0379AC004B9E}"/>
-    <dgm:cxn modelId="{AF0F0661-2887-4660-8CDE-70726F2015F2}" type="presOf" srcId="{7A8A297C-7A33-48B3-888B-D62F93ABB95F}" destId="{853F5BE1-35E6-41B6-A868-B0C4AE3C30C3}" srcOrd="1" destOrd="0" presId="urn:microsoft.com/office/officeart/2005/8/layout/cycle4"/>
-    <dgm:cxn modelId="{9ECB8A65-B04F-4ECF-873B-0A3EF70B1213}" srcId="{8718D101-6F58-4713-9023-E04FB802558B}" destId="{4C45CB6E-386C-483F-849F-3962BD872546}" srcOrd="0" destOrd="0" parTransId="{E5C9AA1E-07A2-48A3-8D33-8316BD638599}" sibTransId="{41CDFAC5-E827-4582-830F-6CA3AF7427AF}"/>
-    <dgm:cxn modelId="{C938C346-BFC6-4BBB-8A5E-23CDCA2AA01F}" srcId="{B5246D22-F1C4-42EF-AF7E-5A6E083E06BE}" destId="{DD4BE7A6-7D48-4015-858C-41A555729EE6}" srcOrd="0" destOrd="0" parTransId="{5C8BF3E7-EB50-4DB3-A492-9D6CCABA4F13}" sibTransId="{D859C5C0-39C3-418E-A4A3-7BC52404B07C}"/>
-    <dgm:cxn modelId="{12F67248-A0B4-4703-B000-1C23B2A5B388}" type="presOf" srcId="{4C45CB6E-386C-483F-849F-3962BD872546}" destId="{C7F7CC99-D77D-4950-A006-B2B47EF8124F}" srcOrd="0" destOrd="0" presId="urn:microsoft.com/office/officeart/2005/8/layout/cycle4"/>
-    <dgm:cxn modelId="{72431A6F-4D1C-4898-BF7D-5C79DB8660F0}" type="presOf" srcId="{8718D101-6F58-4713-9023-E04FB802558B}" destId="{6C1B52EF-0897-493D-8151-CCD00F1DE4F3}" srcOrd="0" destOrd="0" presId="urn:microsoft.com/office/officeart/2005/8/layout/cycle4"/>
-    <dgm:cxn modelId="{C2EA404F-640C-439B-921B-165756642CF3}" type="presOf" srcId="{B323B78F-BB25-49AA-A1BB-D92BB18B27C6}" destId="{7F3AED1E-5E34-49A9-80EE-2BAF95662F63}" srcOrd="0" destOrd="0" presId="urn:microsoft.com/office/officeart/2005/8/layout/cycle4"/>
-    <dgm:cxn modelId="{E8D11270-5DA8-4DD6-BFB6-3D68B7FD2206}" type="presOf" srcId="{B5246D22-F1C4-42EF-AF7E-5A6E083E06BE}" destId="{F888FE5C-8131-4834-9C83-167149FC77C3}" srcOrd="0" destOrd="0" presId="urn:microsoft.com/office/officeart/2005/8/layout/cycle4"/>
-    <dgm:cxn modelId="{9952A954-A397-46DD-9343-2656B2D8454C}" type="presOf" srcId="{EA5DB221-F9BE-4AC9-BF6B-681613B4498B}" destId="{09A3B669-FE4F-484E-A2F8-568EC36E55F8}" srcOrd="0" destOrd="0" presId="urn:microsoft.com/office/officeart/2005/8/layout/cycle4"/>
+    <dgm:cxn modelId="{925372E7-450C-460F-BB87-161383FE8C0F}" type="presOf" srcId="{EA5DB221-F9BE-4AC9-BF6B-681613B4498B}" destId="{956765D7-1687-4132-B2F6-EEAF9BE72C73}" srcOrd="1" destOrd="0" presId="urn:microsoft.com/office/officeart/2005/8/layout/cycle4"/>
     <dgm:cxn modelId="{65B2CB78-4D15-46F0-A1CE-4817674E28B9}" srcId="{B323B78F-BB25-49AA-A1BB-D92BB18B27C6}" destId="{8718D101-6F58-4713-9023-E04FB802558B}" srcOrd="3" destOrd="0" parTransId="{E1997932-BABB-479B-A898-DCE1B67D947D}" sibTransId="{C6B4061C-D82D-4AE9-8C9E-C84FC7804DE9}"/>
-    <dgm:cxn modelId="{28EAB083-08DB-4C8E-87D9-2D807C699C77}" type="presOf" srcId="{4C45CB6E-386C-483F-849F-3962BD872546}" destId="{544580C4-CA5A-4274-8187-1C906BB74BA2}" srcOrd="1" destOrd="0" presId="urn:microsoft.com/office/officeart/2005/8/layout/cycle4"/>
-    <dgm:cxn modelId="{7B9ED8A9-DC19-4CE0-94EB-25B5D6FEB116}" srcId="{B323B78F-BB25-49AA-A1BB-D92BB18B27C6}" destId="{160F1536-9538-4B76-BFA1-B29DB4A6F2CC}" srcOrd="2" destOrd="0" parTransId="{344FCEED-87F7-4C37-93B8-660EBD2EC9C5}" sibTransId="{1E9C847E-E0F6-45A9-9CCF-58F24E915BAE}"/>
-    <dgm:cxn modelId="{FAB39BC5-9C73-4AE5-8CC0-C882D4B93751}" srcId="{E2A41C94-1F9F-452D-83C6-DA9B2D1A2C68}" destId="{EA5DB221-F9BE-4AC9-BF6B-681613B4498B}" srcOrd="0" destOrd="0" parTransId="{83FA5649-E297-4FF8-961C-A110D464F7DD}" sibTransId="{2CD6C70B-E063-4275-95AF-69CDF063F02B}"/>
     <dgm:cxn modelId="{F7EEEBCA-D72A-4843-9771-28FFA8CDF037}" srcId="{B323B78F-BB25-49AA-A1BB-D92BB18B27C6}" destId="{B5246D22-F1C4-42EF-AF7E-5A6E083E06BE}" srcOrd="0" destOrd="0" parTransId="{CB75EFC9-CC7C-4984-B21F-8EC9F40FE35E}" sibTransId="{1D9D3BBA-0EE7-4B0B-83FD-C7BBDA83761B}"/>
-    <dgm:cxn modelId="{925372E7-450C-460F-BB87-161383FE8C0F}" type="presOf" srcId="{EA5DB221-F9BE-4AC9-BF6B-681613B4498B}" destId="{956765D7-1687-4132-B2F6-EEAF9BE72C73}" srcOrd="1" destOrd="0" presId="urn:microsoft.com/office/officeart/2005/8/layout/cycle4"/>
-    <dgm:cxn modelId="{AD8795E8-DA3E-4223-9BB9-366C01F03279}" type="presOf" srcId="{DD4BE7A6-7D48-4015-858C-41A555729EE6}" destId="{DC0E0ED7-EEF4-4931-8EA6-B0593F71D27D}" srcOrd="1" destOrd="0" presId="urn:microsoft.com/office/officeart/2005/8/layout/cycle4"/>
-    <dgm:cxn modelId="{5F32F9EB-EA38-431B-892B-C22E94E5A8F8}" type="presOf" srcId="{7A8A297C-7A33-48B3-888B-D62F93ABB95F}" destId="{26F33BD2-96FC-4362-900B-9153F27E2535}" srcOrd="0" destOrd="0" presId="urn:microsoft.com/office/officeart/2005/8/layout/cycle4"/>
-    <dgm:cxn modelId="{752DD2ED-F008-4B76-B3AC-3B5250D4A691}" type="presOf" srcId="{DD4BE7A6-7D48-4015-858C-41A555729EE6}" destId="{C5BC7F09-7482-4602-8BCA-A6450C56B822}" srcOrd="0" destOrd="0" presId="urn:microsoft.com/office/officeart/2005/8/layout/cycle4"/>
     <dgm:cxn modelId="{11339C88-6B2B-4723-89BE-F046EDE97779}" type="presParOf" srcId="{7F3AED1E-5E34-49A9-80EE-2BAF95662F63}" destId="{49DCCC0D-D2E9-45D5-B207-C99490015020}" srcOrd="0" destOrd="0" presId="urn:microsoft.com/office/officeart/2005/8/layout/cycle4"/>
     <dgm:cxn modelId="{DF388F3B-7B75-44CD-B59D-3F35AA1F3E5E}" type="presParOf" srcId="{49DCCC0D-D2E9-45D5-B207-C99490015020}" destId="{CB0F2D12-7932-4443-89B7-28C7C427EE6A}" srcOrd="0" destOrd="0" presId="urn:microsoft.com/office/officeart/2005/8/layout/cycle4"/>
     <dgm:cxn modelId="{7F196059-F036-4623-BA41-D8EC298744A8}" type="presParOf" srcId="{CB0F2D12-7932-4443-89B7-28C7C427EE6A}" destId="{C5BC7F09-7482-4602-8BCA-A6450C56B822}" srcOrd="0" destOrd="0" presId="urn:microsoft.com/office/officeart/2005/8/layout/cycle4"/>
@@ -4218,7 +4218,7 @@
           <a:p>
             <a:fld id="{8317704E-6B30-443D-8C32-B7EE8DE8C08D}" type="datetimeFigureOut">
               <a:rPr lang="en-US" smtClean="0"/>
-              <a:t>1/7/2020</a:t>
+              <a:t>1/16/2020</a:t>
             </a:fld>
             <a:endParaRPr lang="en-US"/>
           </a:p>
@@ -4383,7 +4383,7 @@
           <a:p>
             <a:fld id="{9ED66144-58ED-4AB2-95A1-AA23D13FB790}" type="datetimeFigureOut">
               <a:rPr lang="en-US" smtClean="0"/>
-              <a:t>1/7/2020</a:t>
+              <a:t>1/16/2020</a:t>
             </a:fld>
             <a:endParaRPr lang="en-US"/>
           </a:p>
@@ -4877,7 +4877,7 @@
           <a:p>
             <a:fld id="{70156384-11F4-4F82-9BAF-86EC487D8F39}" type="datetimeFigureOut">
               <a:rPr lang="en-US" smtClean="0"/>
-              <a:t>1/7/2020</a:t>
+              <a:t>1/16/2020</a:t>
             </a:fld>
             <a:endParaRPr lang="en-US"/>
           </a:p>
@@ -5045,7 +5045,7 @@
           <a:p>
             <a:fld id="{70156384-11F4-4F82-9BAF-86EC487D8F39}" type="datetimeFigureOut">
               <a:rPr lang="en-US" smtClean="0"/>
-              <a:t>1/7/2020</a:t>
+              <a:t>1/16/2020</a:t>
             </a:fld>
             <a:endParaRPr lang="en-US"/>
           </a:p>
@@ -5223,7 +5223,7 @@
           <a:p>
             <a:fld id="{70156384-11F4-4F82-9BAF-86EC487D8F39}" type="datetimeFigureOut">
               <a:rPr lang="en-US" smtClean="0"/>
-              <a:t>1/7/2020</a:t>
+              <a:t>1/16/2020</a:t>
             </a:fld>
             <a:endParaRPr lang="en-US"/>
           </a:p>
@@ -5391,7 +5391,7 @@
           <a:p>
             <a:fld id="{70156384-11F4-4F82-9BAF-86EC487D8F39}" type="datetimeFigureOut">
               <a:rPr lang="en-US" smtClean="0"/>
-              <a:t>1/7/2020</a:t>
+              <a:t>1/16/2020</a:t>
             </a:fld>
             <a:endParaRPr lang="en-US"/>
           </a:p>
@@ -5636,7 +5636,7 @@
           <a:p>
             <a:fld id="{70156384-11F4-4F82-9BAF-86EC487D8F39}" type="datetimeFigureOut">
               <a:rPr lang="en-US" smtClean="0"/>
-              <a:t>1/7/2020</a:t>
+              <a:t>1/16/2020</a:t>
             </a:fld>
             <a:endParaRPr lang="en-US"/>
           </a:p>
@@ -5865,7 +5865,7 @@
           <a:p>
             <a:fld id="{70156384-11F4-4F82-9BAF-86EC487D8F39}" type="datetimeFigureOut">
               <a:rPr lang="en-US" smtClean="0"/>
-              <a:t>1/7/2020</a:t>
+              <a:t>1/16/2020</a:t>
             </a:fld>
             <a:endParaRPr lang="en-US"/>
           </a:p>
@@ -6229,7 +6229,7 @@
           <a:p>
             <a:fld id="{70156384-11F4-4F82-9BAF-86EC487D8F39}" type="datetimeFigureOut">
               <a:rPr lang="en-US" smtClean="0"/>
-              <a:t>1/7/2020</a:t>
+              <a:t>1/16/2020</a:t>
             </a:fld>
             <a:endParaRPr lang="en-US"/>
           </a:p>
@@ -6346,7 +6346,7 @@
           <a:p>
             <a:fld id="{70156384-11F4-4F82-9BAF-86EC487D8F39}" type="datetimeFigureOut">
               <a:rPr lang="en-US" smtClean="0"/>
-              <a:t>1/7/2020</a:t>
+              <a:t>1/16/2020</a:t>
             </a:fld>
             <a:endParaRPr lang="en-US"/>
           </a:p>
@@ -6441,7 +6441,7 @@
           <a:p>
             <a:fld id="{70156384-11F4-4F82-9BAF-86EC487D8F39}" type="datetimeFigureOut">
               <a:rPr lang="en-US" smtClean="0"/>
-              <a:t>1/7/2020</a:t>
+              <a:t>1/16/2020</a:t>
             </a:fld>
             <a:endParaRPr lang="en-US"/>
           </a:p>
@@ -6716,7 +6716,7 @@
           <a:p>
             <a:fld id="{70156384-11F4-4F82-9BAF-86EC487D8F39}" type="datetimeFigureOut">
               <a:rPr lang="en-US" smtClean="0"/>
-              <a:t>1/7/2020</a:t>
+              <a:t>1/16/2020</a:t>
             </a:fld>
             <a:endParaRPr lang="en-US"/>
           </a:p>
@@ -6968,7 +6968,7 @@
           <a:p>
             <a:fld id="{70156384-11F4-4F82-9BAF-86EC487D8F39}" type="datetimeFigureOut">
               <a:rPr lang="en-US" smtClean="0"/>
-              <a:t>1/7/2020</a:t>
+              <a:t>1/16/2020</a:t>
             </a:fld>
             <a:endParaRPr lang="en-US"/>
           </a:p>
@@ -7179,7 +7179,7 @@
           <a:p>
             <a:fld id="{70156384-11F4-4F82-9BAF-86EC487D8F39}" type="datetimeFigureOut">
               <a:rPr lang="en-US" smtClean="0"/>
-              <a:t>1/7/2020</a:t>
+              <a:t>1/16/2020</a:t>
             </a:fld>
             <a:endParaRPr lang="en-US"/>
           </a:p>

</xml_diff>